<commit_message>
Presentación y memoria actualizados
</commit_message>
<xml_diff>
--- a/presentacion/Cómo triunfar en Spotify_ANDERPENAVILLALOBOS.pptx
+++ b/presentacion/Cómo triunfar en Spotify_ANDERPENAVILLALOBOS.pptx
@@ -1805,7 +1805,7 @@
               <a:effectLst/>
               <a:latin typeface="Arial" panose="020B0604020202020204" pitchFamily="34" charset="0"/>
             </a:rPr>
-            <a:t>).</a:t>
+            <a:t>…).</a:t>
           </a:r>
           <a:endParaRPr lang="es-ES" dirty="0"/>
         </a:p>
@@ -1841,17 +1841,17 @@
         <a:lstStyle/>
         <a:p>
           <a:r>
-            <a:rPr kumimoji="0" lang="es-ES" altLang="es-ES" b="1" i="0" u="none" strike="noStrike" cap="none" normalizeH="0" baseline="0" dirty="0">
-              <a:ln/>
-              <a:effectLst/>
+            <a:rPr lang="es-ES" b="1" dirty="0">
               <a:latin typeface="Arial" panose="020B0604020202020204" pitchFamily="34" charset="0"/>
+              <a:cs typeface="Arial" panose="020B0604020202020204" pitchFamily="34" charset="0"/>
             </a:rPr>
-            <a:t>El género determina el éxito por intervención de Spotify</a:t>
+            <a:t>Spotify favorece ciertos géneros frente a otros.</a:t>
           </a:r>
           <a:endParaRPr kumimoji="0" lang="es-ES" altLang="es-ES" b="0" i="0" u="none" strike="noStrike" cap="none" normalizeH="0" baseline="0" dirty="0">
             <a:ln/>
             <a:effectLst/>
             <a:latin typeface="Arial" panose="020B0604020202020204" pitchFamily="34" charset="0"/>
+            <a:cs typeface="Arial" panose="020B0604020202020204" pitchFamily="34" charset="0"/>
           </a:endParaRPr>
         </a:p>
       </dgm:t>
@@ -1891,7 +1891,7 @@
               <a:effectLst/>
               <a:latin typeface="Arial" panose="020B0604020202020204" pitchFamily="34" charset="0"/>
             </a:rPr>
-            <a:t>El día y mes de lanzamiento influyen en el éxito de una canción</a:t>
+            <a:t>El día y mes de lanzamiento influyen en el éxito de una canción.</a:t>
           </a:r>
           <a:endParaRPr kumimoji="0" lang="es-ES" altLang="es-ES" b="0" i="0" u="none" strike="noStrike" cap="none" normalizeH="0" baseline="0" dirty="0">
             <a:ln/>
@@ -1931,12 +1931,12 @@
         <a:lstStyle/>
         <a:p>
           <a:r>
-            <a:rPr kumimoji="0" lang="es-ES" altLang="es-ES" b="1" i="0" u="none" strike="noStrike" cap="none" normalizeH="0" baseline="0">
+            <a:rPr kumimoji="0" lang="es-ES" altLang="es-ES" b="1" i="0" u="none" strike="noStrike" cap="none" normalizeH="0" baseline="0" dirty="0">
               <a:ln/>
               <a:effectLst/>
               <a:latin typeface="Arial" panose="020B0604020202020204" pitchFamily="34" charset="0"/>
             </a:rPr>
-            <a:t>Las canciones más cortas suelen ser más populares</a:t>
+            <a:t>Las canciones más cortas suelen ser más populares.</a:t>
           </a:r>
           <a:endParaRPr kumimoji="0" lang="es-ES" altLang="es-ES" b="0" i="0" u="none" strike="noStrike" cap="none" normalizeH="0" baseline="0" dirty="0">
             <a:ln/>
@@ -1981,7 +1981,7 @@
               <a:effectLst/>
               <a:latin typeface="Arial" panose="020B0604020202020204" pitchFamily="34" charset="0"/>
             </a:rPr>
-            <a:t>Lanzar un álbum con estrategia de singles es efectivo</a:t>
+            <a:t>Lanzar un álbum con estrategia de singles es efectivo.</a:t>
           </a:r>
           <a:endParaRPr kumimoji="0" lang="es-ES" altLang="es-ES" b="0" i="0" u="none" strike="noStrike" cap="none" normalizeH="0" baseline="0" dirty="0">
             <a:ln/>
@@ -2026,7 +2026,7 @@
               <a:effectLst/>
               <a:latin typeface="Arial" panose="020B0604020202020204" pitchFamily="34" charset="0"/>
             </a:rPr>
-            <a:t>Las letras explícitas repercuten en el éxito de una canción</a:t>
+            <a:t>Las letras explícitas repercuten en el éxito de una canción.</a:t>
           </a:r>
           <a:endParaRPr kumimoji="0" lang="es-ES" altLang="es-ES" b="0" i="0" u="none" strike="noStrike" cap="none" normalizeH="0" baseline="0" dirty="0">
             <a:ln/>
@@ -2326,12 +2326,11 @@
         <a:lstStyle/>
         <a:p>
           <a:r>
-            <a:rPr kumimoji="0" lang="es-ES" altLang="es-ES" b="1" i="0" u="none" strike="noStrike" cap="none" normalizeH="0" baseline="0">
-              <a:ln/>
-              <a:effectLst/>
+            <a:rPr lang="es-ES" b="1" dirty="0">
               <a:latin typeface="Arial" panose="020B0604020202020204" pitchFamily="34" charset="0"/>
+              <a:cs typeface="Arial" panose="020B0604020202020204" pitchFamily="34" charset="0"/>
             </a:rPr>
-            <a:t>El género no determina el éxito por intervención de Spotify</a:t>
+            <a:t>Spotify favorece ciertos géneros frente a otros.</a:t>
           </a:r>
           <a:endParaRPr kumimoji="0" lang="es-ES" altLang="es-ES" b="0" i="0" u="none" strike="noStrike" cap="none" normalizeH="0" baseline="0" dirty="0">
             <a:ln/>
@@ -2756,7 +2755,7 @@
   <dgm:whole/>
   <dgm:extLst>
     <a:ext uri="http://schemas.microsoft.com/office/drawing/2008/diagram">
-      <dsp:dataModelExt xmlns:dsp="http://schemas.microsoft.com/office/drawing/2008/diagram" relId="rId6" minVer="http://schemas.openxmlformats.org/drawingml/2006/diagram"/>
+      <dsp:dataModelExt xmlns:dsp="http://schemas.microsoft.com/office/drawing/2008/diagram" relId="rId7" minVer="http://schemas.openxmlformats.org/drawingml/2006/diagram"/>
     </a:ext>
   </dgm:extLst>
 </dgm:dataModel>
@@ -2917,7 +2916,7 @@
               <a:effectLst/>
               <a:latin typeface="Arial" panose="020B0604020202020204" pitchFamily="34" charset="0"/>
             </a:rPr>
-            <a:t>).</a:t>
+            <a:t>…).</a:t>
           </a:r>
           <a:endParaRPr lang="es-ES" sz="1700" kern="1200" dirty="0"/>
         </a:p>
@@ -3044,17 +3043,17 @@
             <a:buNone/>
           </a:pPr>
           <a:r>
-            <a:rPr kumimoji="0" lang="es-ES" altLang="es-ES" sz="1700" b="1" i="0" u="none" strike="noStrike" kern="1200" cap="none" normalizeH="0" baseline="0" dirty="0">
-              <a:ln/>
-              <a:effectLst/>
+            <a:rPr lang="es-ES" sz="1700" b="1" kern="1200" dirty="0">
               <a:latin typeface="Arial" panose="020B0604020202020204" pitchFamily="34" charset="0"/>
+              <a:cs typeface="Arial" panose="020B0604020202020204" pitchFamily="34" charset="0"/>
             </a:rPr>
-            <a:t>El género determina el éxito por intervención de Spotify</a:t>
+            <a:t>Spotify favorece ciertos géneros frente a otros.</a:t>
           </a:r>
           <a:endParaRPr kumimoji="0" lang="es-ES" altLang="es-ES" sz="1700" b="0" i="0" u="none" strike="noStrike" kern="1200" cap="none" normalizeH="0" baseline="0" dirty="0">
             <a:ln/>
             <a:effectLst/>
             <a:latin typeface="Arial" panose="020B0604020202020204" pitchFamily="34" charset="0"/>
+            <a:cs typeface="Arial" panose="020B0604020202020204" pitchFamily="34" charset="0"/>
           </a:endParaRPr>
         </a:p>
       </dsp:txBody>
@@ -3185,7 +3184,7 @@
               <a:effectLst/>
               <a:latin typeface="Arial" panose="020B0604020202020204" pitchFamily="34" charset="0"/>
             </a:rPr>
-            <a:t>El día y mes de lanzamiento influyen en el éxito de una canción</a:t>
+            <a:t>El día y mes de lanzamiento influyen en el éxito de una canción.</a:t>
           </a:r>
           <a:endParaRPr kumimoji="0" lang="es-ES" altLang="es-ES" sz="1700" b="0" i="0" u="none" strike="noStrike" kern="1200" cap="none" normalizeH="0" baseline="0" dirty="0">
             <a:ln/>
@@ -3316,12 +3315,12 @@
             <a:buNone/>
           </a:pPr>
           <a:r>
-            <a:rPr kumimoji="0" lang="es-ES" altLang="es-ES" sz="1700" b="1" i="0" u="none" strike="noStrike" kern="1200" cap="none" normalizeH="0" baseline="0">
+            <a:rPr kumimoji="0" lang="es-ES" altLang="es-ES" sz="1700" b="1" i="0" u="none" strike="noStrike" kern="1200" cap="none" normalizeH="0" baseline="0" dirty="0">
               <a:ln/>
               <a:effectLst/>
               <a:latin typeface="Arial" panose="020B0604020202020204" pitchFamily="34" charset="0"/>
             </a:rPr>
-            <a:t>Las canciones más cortas suelen ser más populares</a:t>
+            <a:t>Las canciones más cortas suelen ser más populares.</a:t>
           </a:r>
           <a:endParaRPr kumimoji="0" lang="es-ES" altLang="es-ES" sz="1700" b="0" i="0" u="none" strike="noStrike" kern="1200" cap="none" normalizeH="0" baseline="0" dirty="0">
             <a:ln/>
@@ -3457,7 +3456,7 @@
               <a:effectLst/>
               <a:latin typeface="Arial" panose="020B0604020202020204" pitchFamily="34" charset="0"/>
             </a:rPr>
-            <a:t>Las letras explícitas repercuten en el éxito de una canción</a:t>
+            <a:t>Las letras explícitas repercuten en el éxito de una canción.</a:t>
           </a:r>
           <a:endParaRPr kumimoji="0" lang="es-ES" altLang="es-ES" sz="1700" b="0" i="0" u="none" strike="noStrike" kern="1200" cap="none" normalizeH="0" baseline="0" dirty="0">
             <a:ln/>
@@ -3593,7 +3592,7 @@
               <a:effectLst/>
               <a:latin typeface="Arial" panose="020B0604020202020204" pitchFamily="34" charset="0"/>
             </a:rPr>
-            <a:t>Lanzar un álbum con estrategia de singles es efectivo</a:t>
+            <a:t>Lanzar un álbum con estrategia de singles es efectivo.</a:t>
           </a:r>
           <a:endParaRPr kumimoji="0" lang="es-ES" altLang="es-ES" sz="1700" b="0" i="0" u="none" strike="noStrike" kern="1200" cap="none" normalizeH="0" baseline="0" dirty="0">
             <a:ln/>
@@ -3915,12 +3914,11 @@
             <a:buNone/>
           </a:pPr>
           <a:r>
-            <a:rPr kumimoji="0" lang="es-ES" altLang="es-ES" sz="1500" b="1" i="0" u="none" strike="noStrike" kern="1200" cap="none" normalizeH="0" baseline="0">
-              <a:ln/>
-              <a:effectLst/>
+            <a:rPr lang="es-ES" sz="1500" b="1" kern="1200" dirty="0">
               <a:latin typeface="Arial" panose="020B0604020202020204" pitchFamily="34" charset="0"/>
+              <a:cs typeface="Arial" panose="020B0604020202020204" pitchFamily="34" charset="0"/>
             </a:rPr>
-            <a:t>El género no determina el éxito por intervención de Spotify</a:t>
+            <a:t>Spotify favorece ciertos géneros frente a otros.</a:t>
           </a:r>
           <a:endParaRPr kumimoji="0" lang="es-ES" altLang="es-ES" sz="1500" b="0" i="0" u="none" strike="noStrike" kern="1200" cap="none" normalizeH="0" baseline="0" dirty="0">
             <a:ln/>
@@ -9238,7 +9236,7 @@
           <a:p>
             <a:fld id="{20D715C0-E22A-4D1C-88B5-23890E9AC1E1}" type="datetimeFigureOut">
               <a:rPr lang="es-ES" smtClean="0"/>
-              <a:t>05/04/2025</a:t>
+              <a:t>06/04/2025</a:t>
             </a:fld>
             <a:endParaRPr lang="es-ES"/>
           </a:p>
@@ -10223,6 +10221,90 @@
 </p:notes>
 </file>
 
+<file path=ppt/notesSlides/notesSlide9.xml><?xml version="1.0" encoding="utf-8"?>
+<p:notes xmlns:a="http://schemas.openxmlformats.org/drawingml/2006/main" xmlns:r="http://schemas.openxmlformats.org/officeDocument/2006/relationships" xmlns:p="http://schemas.openxmlformats.org/presentationml/2006/main">
+  <p:cSld>
+    <p:spTree>
+      <p:nvGrpSpPr>
+        <p:cNvPr id="1" name=""/>
+        <p:cNvGrpSpPr/>
+        <p:nvPr/>
+      </p:nvGrpSpPr>
+      <p:grpSpPr>
+        <a:xfrm>
+          <a:off x="0" y="0"/>
+          <a:ext cx="0" cy="0"/>
+          <a:chOff x="0" y="0"/>
+          <a:chExt cx="0" cy="0"/>
+        </a:xfrm>
+      </p:grpSpPr>
+      <p:sp>
+        <p:nvSpPr>
+          <p:cNvPr id="2" name="Marcador de imagen de diapositiva 1"/>
+          <p:cNvSpPr>
+            <a:spLocks noGrp="1" noRot="1" noChangeAspect="1"/>
+          </p:cNvSpPr>
+          <p:nvPr>
+            <p:ph type="sldImg"/>
+          </p:nvPr>
+        </p:nvSpPr>
+        <p:spPr/>
+      </p:sp>
+      <p:sp>
+        <p:nvSpPr>
+          <p:cNvPr id="3" name="Marcador de notas 2"/>
+          <p:cNvSpPr>
+            <a:spLocks noGrp="1"/>
+          </p:cNvSpPr>
+          <p:nvPr>
+            <p:ph type="body" idx="1"/>
+          </p:nvPr>
+        </p:nvSpPr>
+        <p:spPr/>
+        <p:txBody>
+          <a:bodyPr/>
+          <a:lstStyle/>
+          <a:p>
+            <a:endParaRPr lang="es-ES" dirty="0"/>
+          </a:p>
+        </p:txBody>
+      </p:sp>
+      <p:sp>
+        <p:nvSpPr>
+          <p:cNvPr id="4" name="Marcador de número de diapositiva 3"/>
+          <p:cNvSpPr>
+            <a:spLocks noGrp="1"/>
+          </p:cNvSpPr>
+          <p:nvPr>
+            <p:ph type="sldNum" sz="quarter" idx="5"/>
+          </p:nvPr>
+        </p:nvSpPr>
+        <p:spPr/>
+        <p:txBody>
+          <a:bodyPr/>
+          <a:lstStyle/>
+          <a:p>
+            <a:fld id="{1AC6D009-F329-4F8A-8AE1-8EA1863FF191}" type="slidenum">
+              <a:rPr lang="es-ES" smtClean="0"/>
+              <a:t>19</a:t>
+            </a:fld>
+            <a:endParaRPr lang="es-ES"/>
+          </a:p>
+        </p:txBody>
+      </p:sp>
+    </p:spTree>
+    <p:extLst>
+      <p:ext uri="{BB962C8B-B14F-4D97-AF65-F5344CB8AC3E}">
+        <p14:creationId xmlns:p14="http://schemas.microsoft.com/office/powerpoint/2010/main" val="1011032566"/>
+      </p:ext>
+    </p:extLst>
+  </p:cSld>
+  <p:clrMapOvr>
+    <a:masterClrMapping/>
+  </p:clrMapOvr>
+</p:notes>
+</file>
+
 <file path=ppt/slideLayouts/slideLayout1.xml><?xml version="1.0" encoding="utf-8"?>
 <p:sldLayout xmlns:a="http://schemas.openxmlformats.org/drawingml/2006/main" xmlns:r="http://schemas.openxmlformats.org/officeDocument/2006/relationships" xmlns:p="http://schemas.openxmlformats.org/presentationml/2006/main" type="title" preserve="1">
   <p:cSld name="Diapositiva de título">
@@ -10370,7 +10452,7 @@
           <a:p>
             <a:fld id="{116A90F1-1ED3-4C59-AE5F-C1704E0852C3}" type="datetimeFigureOut">
               <a:rPr lang="es-ES" smtClean="0"/>
-              <a:t>05/04/2025</a:t>
+              <a:t>06/04/2025</a:t>
             </a:fld>
             <a:endParaRPr lang="es-ES"/>
           </a:p>
@@ -10568,7 +10650,7 @@
           <a:p>
             <a:fld id="{116A90F1-1ED3-4C59-AE5F-C1704E0852C3}" type="datetimeFigureOut">
               <a:rPr lang="es-ES" smtClean="0"/>
-              <a:t>05/04/2025</a:t>
+              <a:t>06/04/2025</a:t>
             </a:fld>
             <a:endParaRPr lang="es-ES"/>
           </a:p>
@@ -10776,7 +10858,7 @@
           <a:p>
             <a:fld id="{116A90F1-1ED3-4C59-AE5F-C1704E0852C3}" type="datetimeFigureOut">
               <a:rPr lang="es-ES" smtClean="0"/>
-              <a:t>05/04/2025</a:t>
+              <a:t>06/04/2025</a:t>
             </a:fld>
             <a:endParaRPr lang="es-ES"/>
           </a:p>
@@ -10974,7 +11056,7 @@
           <a:p>
             <a:fld id="{116A90F1-1ED3-4C59-AE5F-C1704E0852C3}" type="datetimeFigureOut">
               <a:rPr lang="es-ES" smtClean="0"/>
-              <a:t>05/04/2025</a:t>
+              <a:t>06/04/2025</a:t>
             </a:fld>
             <a:endParaRPr lang="es-ES"/>
           </a:p>
@@ -11249,7 +11331,7 @@
           <a:p>
             <a:fld id="{116A90F1-1ED3-4C59-AE5F-C1704E0852C3}" type="datetimeFigureOut">
               <a:rPr lang="es-ES" smtClean="0"/>
-              <a:t>05/04/2025</a:t>
+              <a:t>06/04/2025</a:t>
             </a:fld>
             <a:endParaRPr lang="es-ES"/>
           </a:p>
@@ -11514,7 +11596,7 @@
           <a:p>
             <a:fld id="{116A90F1-1ED3-4C59-AE5F-C1704E0852C3}" type="datetimeFigureOut">
               <a:rPr lang="es-ES" smtClean="0"/>
-              <a:t>05/04/2025</a:t>
+              <a:t>06/04/2025</a:t>
             </a:fld>
             <a:endParaRPr lang="es-ES"/>
           </a:p>
@@ -11926,7 +12008,7 @@
           <a:p>
             <a:fld id="{116A90F1-1ED3-4C59-AE5F-C1704E0852C3}" type="datetimeFigureOut">
               <a:rPr lang="es-ES" smtClean="0"/>
-              <a:t>05/04/2025</a:t>
+              <a:t>06/04/2025</a:t>
             </a:fld>
             <a:endParaRPr lang="es-ES"/>
           </a:p>
@@ -12067,7 +12149,7 @@
           <a:p>
             <a:fld id="{116A90F1-1ED3-4C59-AE5F-C1704E0852C3}" type="datetimeFigureOut">
               <a:rPr lang="es-ES" smtClean="0"/>
-              <a:t>05/04/2025</a:t>
+              <a:t>06/04/2025</a:t>
             </a:fld>
             <a:endParaRPr lang="es-ES"/>
           </a:p>
@@ -12180,7 +12262,7 @@
           <a:p>
             <a:fld id="{116A90F1-1ED3-4C59-AE5F-C1704E0852C3}" type="datetimeFigureOut">
               <a:rPr lang="es-ES" smtClean="0"/>
-              <a:t>05/04/2025</a:t>
+              <a:t>06/04/2025</a:t>
             </a:fld>
             <a:endParaRPr lang="es-ES"/>
           </a:p>
@@ -12491,7 +12573,7 @@
           <a:p>
             <a:fld id="{116A90F1-1ED3-4C59-AE5F-C1704E0852C3}" type="datetimeFigureOut">
               <a:rPr lang="es-ES" smtClean="0"/>
-              <a:t>05/04/2025</a:t>
+              <a:t>06/04/2025</a:t>
             </a:fld>
             <a:endParaRPr lang="es-ES"/>
           </a:p>
@@ -12779,7 +12861,7 @@
           <a:p>
             <a:fld id="{116A90F1-1ED3-4C59-AE5F-C1704E0852C3}" type="datetimeFigureOut">
               <a:rPr lang="es-ES" smtClean="0"/>
-              <a:t>05/04/2025</a:t>
+              <a:t>06/04/2025</a:t>
             </a:fld>
             <a:endParaRPr lang="es-ES"/>
           </a:p>
@@ -13020,7 +13102,7 @@
           <a:p>
             <a:fld id="{116A90F1-1ED3-4C59-AE5F-C1704E0852C3}" type="datetimeFigureOut">
               <a:rPr lang="es-ES" smtClean="0"/>
-              <a:t>05/04/2025</a:t>
+              <a:t>06/04/2025</a:t>
             </a:fld>
             <a:endParaRPr lang="es-ES"/>
           </a:p>
@@ -13494,21 +13576,70 @@
         </p:nvSpPr>
         <p:spPr>
           <a:xfrm>
-            <a:off x="1524000" y="4547612"/>
-            <a:ext cx="9144000" cy="793316"/>
+            <a:off x="2098766" y="4547612"/>
+            <a:ext cx="7994468" cy="538194"/>
           </a:xfrm>
         </p:spPr>
         <p:txBody>
-          <a:bodyPr/>
+          <a:bodyPr>
+            <a:normAutofit fontScale="85000" lnSpcReduction="20000"/>
+          </a:bodyPr>
           <a:lstStyle/>
           <a:p>
             <a:r>
               <a:rPr lang="es-ES" dirty="0"/>
-              <a:t>¿Tiene Spotify influencia directa en el éxito de las canciones en función de sus características?</a:t>
+              <a:t>¿Favorece Spotify los lanzamiento de ciertos tipos de canciones por sus características?</a:t>
             </a:r>
           </a:p>
         </p:txBody>
       </p:sp>
+      <p:pic>
+        <p:nvPicPr>
+          <p:cNvPr id="1028" name="Picture 4" descr="Flecha Crecimiento PNG para descargar gratis">
+            <a:extLst>
+              <a:ext uri="{FF2B5EF4-FFF2-40B4-BE49-F238E27FC236}">
+                <a16:creationId xmlns:a16="http://schemas.microsoft.com/office/drawing/2014/main" id="{3AA5DDC4-19E4-4F59-BA17-3155BB9FCA8E}"/>
+              </a:ext>
+            </a:extLst>
+          </p:cNvPr>
+          <p:cNvPicPr>
+            <a:picLocks noChangeAspect="1" noChangeArrowheads="1"/>
+          </p:cNvPicPr>
+          <p:nvPr/>
+        </p:nvPicPr>
+        <p:blipFill>
+          <a:blip r:embed="rId2">
+            <a:extLst>
+              <a:ext uri="{28A0092B-C50C-407E-A947-70E740481C1C}">
+                <a14:useLocalDpi xmlns:a14="http://schemas.microsoft.com/office/drawing/2010/main" val="0"/>
+              </a:ext>
+            </a:extLst>
+          </a:blip>
+          <a:srcRect/>
+          <a:stretch>
+            <a:fillRect/>
+          </a:stretch>
+        </p:blipFill>
+        <p:spPr bwMode="auto">
+          <a:xfrm>
+            <a:off x="9778652" y="5340928"/>
+            <a:ext cx="2413347" cy="1508342"/>
+          </a:xfrm>
+          <a:prstGeom prst="rect">
+            <a:avLst/>
+          </a:prstGeom>
+          <a:noFill/>
+          <a:extLst>
+            <a:ext uri="{909E8E84-426E-40DD-AFC4-6F175D3DCCD1}">
+              <a14:hiddenFill xmlns:a14="http://schemas.microsoft.com/office/drawing/2010/main">
+                <a:solidFill>
+                  <a:srgbClr val="FFFFFF"/>
+                </a:solidFill>
+              </a14:hiddenFill>
+            </a:ext>
+          </a:extLst>
+        </p:spPr>
+      </p:pic>
     </p:spTree>
     <p:extLst>
       <p:ext uri="{BB962C8B-B14F-4D97-AF65-F5344CB8AC3E}">
@@ -14591,42 +14722,6 @@
           <a:chExt cx="0" cy="0"/>
         </a:xfrm>
       </p:grpSpPr>
-      <p:pic>
-        <p:nvPicPr>
-          <p:cNvPr id="5" name="Imagen 4">
-            <a:extLst>
-              <a:ext uri="{FF2B5EF4-FFF2-40B4-BE49-F238E27FC236}">
-                <a16:creationId xmlns:a16="http://schemas.microsoft.com/office/drawing/2014/main" id="{FB2379B8-E3A0-45BC-9E08-D032D0E344D9}"/>
-              </a:ext>
-            </a:extLst>
-          </p:cNvPr>
-          <p:cNvPicPr>
-            <a:picLocks noChangeAspect="1"/>
-          </p:cNvPicPr>
-          <p:nvPr/>
-        </p:nvPicPr>
-        <p:blipFill>
-          <a:blip r:embed="rId3">
-            <a:extLst>
-              <a:ext uri="{28A0092B-C50C-407E-A947-70E740481C1C}">
-                <a14:useLocalDpi xmlns:a14="http://schemas.microsoft.com/office/drawing/2010/main" val="0"/>
-              </a:ext>
-            </a:extLst>
-          </a:blip>
-          <a:stretch>
-            <a:fillRect/>
-          </a:stretch>
-        </p:blipFill>
-        <p:spPr>
-          <a:xfrm>
-            <a:off x="2753592" y="232406"/>
-            <a:ext cx="7211652" cy="4574060"/>
-          </a:xfrm>
-          <a:prstGeom prst="rect">
-            <a:avLst/>
-          </a:prstGeom>
-        </p:spPr>
-      </p:pic>
       <p:sp>
         <p:nvSpPr>
           <p:cNvPr id="13" name="CuadroTexto 12">
@@ -14713,7 +14808,7 @@
                 <a:effectLst/>
                 <a:latin typeface="+mj-lt"/>
               </a:rPr>
-              <a:t>canciones más cortas</a:t>
+              <a:t>canciones más cortas.</a:t>
             </a:r>
             <a:endParaRPr kumimoji="0" lang="es-ES" altLang="es-ES" sz="1800" b="0" i="0" u="none" strike="noStrike" cap="none" normalizeH="0" baseline="0" dirty="0">
               <a:ln>
@@ -14767,11 +14862,47 @@
                 <a:effectLst/>
                 <a:latin typeface="+mj-lt"/>
               </a:rPr>
-              <a:t> entre duración y popularidad</a:t>
+              <a:t> entre duración y popularidad.</a:t>
             </a:r>
           </a:p>
         </p:txBody>
       </p:sp>
+      <p:pic>
+        <p:nvPicPr>
+          <p:cNvPr id="5" name="Imagen 4">
+            <a:extLst>
+              <a:ext uri="{FF2B5EF4-FFF2-40B4-BE49-F238E27FC236}">
+                <a16:creationId xmlns:a16="http://schemas.microsoft.com/office/drawing/2014/main" id="{FB2379B8-E3A0-45BC-9E08-D032D0E344D9}"/>
+              </a:ext>
+            </a:extLst>
+          </p:cNvPr>
+          <p:cNvPicPr>
+            <a:picLocks noChangeAspect="1"/>
+          </p:cNvPicPr>
+          <p:nvPr/>
+        </p:nvPicPr>
+        <p:blipFill>
+          <a:blip r:embed="rId3">
+            <a:extLst>
+              <a:ext uri="{28A0092B-C50C-407E-A947-70E740481C1C}">
+                <a14:useLocalDpi xmlns:a14="http://schemas.microsoft.com/office/drawing/2010/main" val="0"/>
+              </a:ext>
+            </a:extLst>
+          </a:blip>
+          <a:stretch>
+            <a:fillRect/>
+          </a:stretch>
+        </p:blipFill>
+        <p:spPr>
+          <a:xfrm>
+            <a:off x="2753592" y="232406"/>
+            <a:ext cx="7211652" cy="4574060"/>
+          </a:xfrm>
+          <a:prstGeom prst="rect">
+            <a:avLst/>
+          </a:prstGeom>
+        </p:spPr>
+      </p:pic>
       <p:sp>
         <p:nvSpPr>
           <p:cNvPr id="8" name="CuadroTexto 7">
@@ -14787,7 +14918,7 @@
         <p:spPr>
           <a:xfrm>
             <a:off x="3204442" y="5516814"/>
-            <a:ext cx="6309952" cy="923330"/>
+            <a:ext cx="6309952" cy="646331"/>
           </a:xfrm>
           <a:prstGeom prst="rect">
             <a:avLst/>
@@ -14902,21 +15033,18 @@
                 <a:effectLst/>
                 <a:latin typeface="+mj-lt"/>
               </a:rPr>
-              <a:t>Las canciones más largas tienden a ser menos populares</a:t>
+              <a:t>Las canciones más largas tienden a ser menos populares.</a:t>
             </a:r>
-            <a:r>
-              <a:rPr kumimoji="0" lang="es-ES" altLang="es-ES" sz="1800" b="0" i="0" u="none" strike="noStrike" cap="none" normalizeH="0" baseline="0" dirty="0">
-                <a:ln>
-                  <a:noFill/>
-                </a:ln>
-                <a:solidFill>
-                  <a:schemeClr val="tx1"/>
-                </a:solidFill>
-                <a:effectLst/>
-                <a:latin typeface="+mj-lt"/>
-              </a:rPr>
-              <a:t>, pero la duración no es el único factor determinante.</a:t>
-            </a:r>
+            <a:endParaRPr kumimoji="0" lang="es-ES" altLang="es-ES" sz="1800" b="0" i="0" u="none" strike="noStrike" cap="none" normalizeH="0" baseline="0" dirty="0">
+              <a:ln>
+                <a:noFill/>
+              </a:ln>
+              <a:solidFill>
+                <a:schemeClr val="tx1"/>
+              </a:solidFill>
+              <a:effectLst/>
+              <a:latin typeface="+mj-lt"/>
+            </a:endParaRPr>
           </a:p>
         </p:txBody>
       </p:sp>
@@ -14948,7 +15076,7 @@
         </p:blipFill>
         <p:spPr>
           <a:xfrm>
-            <a:off x="2572985" y="257097"/>
+            <a:off x="2572985" y="213554"/>
             <a:ext cx="7046029" cy="4558223"/>
           </a:xfrm>
           <a:prstGeom prst="rect">
@@ -16735,7 +16863,7 @@
           <p:nvPr>
             <p:extLst>
               <p:ext uri="{D42A27DB-BD31-4B8C-83A1-F6EECF244321}">
-                <p14:modId xmlns:p14="http://schemas.microsoft.com/office/powerpoint/2010/main" val="3116459285"/>
+                <p14:modId xmlns:p14="http://schemas.microsoft.com/office/powerpoint/2010/main" val="153467717"/>
               </p:ext>
             </p:extLst>
           </p:nvPr>
@@ -16746,7 +16874,7 @@
         </p:xfrm>
         <a:graphic>
           <a:graphicData uri="http://schemas.openxmlformats.org/drawingml/2006/diagram">
-            <dgm:relIds xmlns:dgm="http://schemas.openxmlformats.org/drawingml/2006/diagram" xmlns:r="http://schemas.openxmlformats.org/officeDocument/2006/relationships" r:dm="rId2" r:lo="rId3" r:qs="rId4" r:cs="rId5"/>
+            <dgm:relIds xmlns:dgm="http://schemas.openxmlformats.org/drawingml/2006/diagram" xmlns:r="http://schemas.openxmlformats.org/officeDocument/2006/relationships" r:dm="rId3" r:lo="rId4" r:qs="rId5" r:cs="rId6"/>
           </a:graphicData>
         </a:graphic>
       </p:graphicFrame>
@@ -16765,7 +16893,7 @@
           <p:nvPr/>
         </p:nvPicPr>
         <p:blipFill>
-          <a:blip r:embed="rId7">
+          <a:blip r:embed="rId8">
             <a:extLst>
               <a:ext uri="{28A0092B-C50C-407E-A947-70E740481C1C}">
                 <a14:useLocalDpi xmlns:a14="http://schemas.microsoft.com/office/drawing/2010/main" val="0"/>
@@ -16873,7 +17001,7 @@
           <p:nvPr>
             <p:extLst>
               <p:ext uri="{D42A27DB-BD31-4B8C-83A1-F6EECF244321}">
-                <p14:modId xmlns:p14="http://schemas.microsoft.com/office/powerpoint/2010/main" val="3427787719"/>
+                <p14:modId xmlns:p14="http://schemas.microsoft.com/office/powerpoint/2010/main" val="1260308950"/>
               </p:ext>
             </p:extLst>
           </p:nvPr>
@@ -17082,6 +17210,51 @@
           <a:xfrm>
             <a:off x="4429991" y="3429000"/>
             <a:ext cx="3332017" cy="3332017"/>
+          </a:xfrm>
+          <a:prstGeom prst="rect">
+            <a:avLst/>
+          </a:prstGeom>
+          <a:noFill/>
+          <a:extLst>
+            <a:ext uri="{909E8E84-426E-40DD-AFC4-6F175D3DCCD1}">
+              <a14:hiddenFill xmlns:a14="http://schemas.microsoft.com/office/drawing/2010/main">
+                <a:solidFill>
+                  <a:srgbClr val="FFFFFF"/>
+                </a:solidFill>
+              </a14:hiddenFill>
+            </a:ext>
+          </a:extLst>
+        </p:spPr>
+      </p:pic>
+      <p:pic>
+        <p:nvPicPr>
+          <p:cNvPr id="5" name="Picture 2" descr="Dinero png by iamlupitacarbajal on DeviantArt">
+            <a:extLst>
+              <a:ext uri="{FF2B5EF4-FFF2-40B4-BE49-F238E27FC236}">
+                <a16:creationId xmlns:a16="http://schemas.microsoft.com/office/drawing/2014/main" id="{24BFAF84-6FE3-4665-A525-E95975F67082}"/>
+              </a:ext>
+            </a:extLst>
+          </p:cNvPr>
+          <p:cNvPicPr>
+            <a:picLocks noChangeAspect="1" noChangeArrowheads="1"/>
+          </p:cNvPicPr>
+          <p:nvPr/>
+        </p:nvPicPr>
+        <p:blipFill rotWithShape="1">
+          <a:blip r:embed="rId3">
+            <a:extLst>
+              <a:ext uri="{28A0092B-C50C-407E-A947-70E740481C1C}">
+                <a14:useLocalDpi xmlns:a14="http://schemas.microsoft.com/office/drawing/2010/main" val="0"/>
+              </a:ext>
+            </a:extLst>
+          </a:blip>
+          <a:srcRect r="48714"/>
+          <a:stretch/>
+        </p:blipFill>
+        <p:spPr bwMode="auto">
+          <a:xfrm>
+            <a:off x="7940" y="2237047"/>
+            <a:ext cx="1991189" cy="3658906"/>
           </a:xfrm>
           <a:prstGeom prst="rect">
             <a:avLst/>
@@ -17410,6 +17583,41 @@
                                   </p:childTnLst>
                                 </p:cTn>
                               </p:par>
+                              <p:par>
+                                <p:cTn id="21" presetID="10" presetClass="entr" presetSubtype="0" fill="hold" nodeType="withEffect">
+                                  <p:stCondLst>
+                                    <p:cond delay="0"/>
+                                  </p:stCondLst>
+                                  <p:childTnLst>
+                                    <p:set>
+                                      <p:cBhvr>
+                                        <p:cTn id="22" dur="1" fill="hold">
+                                          <p:stCondLst>
+                                            <p:cond delay="0"/>
+                                          </p:stCondLst>
+                                        </p:cTn>
+                                        <p:tgtEl>
+                                          <p:spTgt spid="5"/>
+                                        </p:tgtEl>
+                                        <p:attrNameLst>
+                                          <p:attrName>style.visibility</p:attrName>
+                                        </p:attrNameLst>
+                                      </p:cBhvr>
+                                      <p:to>
+                                        <p:strVal val="visible"/>
+                                      </p:to>
+                                    </p:set>
+                                    <p:animEffect transition="in" filter="fade">
+                                      <p:cBhvr>
+                                        <p:cTn id="23" dur="500"/>
+                                        <p:tgtEl>
+                                          <p:spTgt spid="5"/>
+                                        </p:tgtEl>
+                                      </p:cBhvr>
+                                    </p:animEffect>
+                                  </p:childTnLst>
+                                </p:cTn>
+                              </p:par>
                             </p:childTnLst>
                           </p:cTn>
                         </p:par>
@@ -17574,14 +17782,11 @@
               <a:rPr lang="es-ES" altLang="es-ES" sz="1600" b="1" dirty="0">
                 <a:latin typeface="+mj-lt"/>
               </a:rPr>
-              <a:t>El público no muestra una preferencia clara</a:t>
+              <a:t>El público puede no mostrar una preferencia clara.</a:t>
             </a:r>
-            <a:r>
-              <a:rPr lang="es-ES" altLang="es-ES" sz="1600" dirty="0">
-                <a:latin typeface="+mj-lt"/>
-              </a:rPr>
-              <a:t> por un estilo específico.</a:t>
-            </a:r>
+            <a:endParaRPr lang="es-ES" altLang="es-ES" sz="1600" dirty="0">
+              <a:latin typeface="+mj-lt"/>
+            </a:endParaRPr>
           </a:p>
         </p:txBody>
       </p:sp>
@@ -19220,21 +19425,18 @@
                 <a:effectLst/>
                 <a:latin typeface="+mj-lt"/>
               </a:rPr>
-              <a:t>Géneros con pocas canciones pueden destacar -&gt; </a:t>
+              <a:t>Géneros con pocas canciones pueden destacar.</a:t>
             </a:r>
-            <a:r>
-              <a:rPr kumimoji="0" lang="es-ES" altLang="es-ES" sz="1800" i="0" u="none" strike="noStrike" cap="none" normalizeH="0" baseline="0" dirty="0">
-                <a:ln>
-                  <a:noFill/>
-                </a:ln>
-                <a:solidFill>
-                  <a:schemeClr val="tx1"/>
-                </a:solidFill>
-                <a:effectLst/>
-                <a:latin typeface="+mj-lt"/>
-              </a:rPr>
-              <a:t>son bien recibidos.</a:t>
-            </a:r>
+            <a:endParaRPr kumimoji="0" lang="es-ES" altLang="es-ES" sz="1800" i="0" u="none" strike="noStrike" cap="none" normalizeH="0" baseline="0" dirty="0">
+              <a:ln>
+                <a:noFill/>
+              </a:ln>
+              <a:solidFill>
+                <a:schemeClr val="tx1"/>
+              </a:solidFill>
+              <a:effectLst/>
+              <a:latin typeface="+mj-lt"/>
+            </a:endParaRPr>
           </a:p>
         </p:txBody>
       </p:sp>
@@ -19304,20 +19506,7 @@
                 <a:effectLst/>
                 <a:latin typeface="+mj-lt"/>
               </a:rPr>
-              <a:t>El favoritismo de Spotify parece depender más de la demanda y la curaduría algorítmica</a:t>
-            </a:r>
-            <a:r>
-              <a:rPr kumimoji="0" lang="es-ES" altLang="es-ES" sz="2400" b="0" i="0" u="none" strike="noStrike" cap="none" normalizeH="0" baseline="0" dirty="0">
-                <a:ln>
-                  <a:noFill/>
-                </a:ln>
-                <a:solidFill>
-                  <a:schemeClr val="tx1"/>
-                </a:solidFill>
-                <a:effectLst/>
-                <a:latin typeface="+mj-lt"/>
-              </a:rPr>
-              <a:t> que de la cantidad de contenido.</a:t>
+              <a:t>El favoritismo de Spotify parece depender más de la demanda y la curaduría algorítmica que de la cantidad de contenido.</a:t>
             </a:r>
           </a:p>
         </p:txBody>
@@ -19556,78 +19745,6 @@
           <a:chExt cx="0" cy="0"/>
         </a:xfrm>
       </p:grpSpPr>
-      <p:pic>
-        <p:nvPicPr>
-          <p:cNvPr id="3" name="Imagen 2">
-            <a:extLst>
-              <a:ext uri="{FF2B5EF4-FFF2-40B4-BE49-F238E27FC236}">
-                <a16:creationId xmlns:a16="http://schemas.microsoft.com/office/drawing/2014/main" id="{98A2463E-4034-4F5C-AA4C-3FC4756294E6}"/>
-              </a:ext>
-            </a:extLst>
-          </p:cNvPr>
-          <p:cNvPicPr>
-            <a:picLocks noChangeAspect="1"/>
-          </p:cNvPicPr>
-          <p:nvPr/>
-        </p:nvPicPr>
-        <p:blipFill>
-          <a:blip r:embed="rId3">
-            <a:extLst>
-              <a:ext uri="{28A0092B-C50C-407E-A947-70E740481C1C}">
-                <a14:useLocalDpi xmlns:a14="http://schemas.microsoft.com/office/drawing/2010/main" val="0"/>
-              </a:ext>
-            </a:extLst>
-          </a:blip>
-          <a:stretch>
-            <a:fillRect/>
-          </a:stretch>
-        </p:blipFill>
-        <p:spPr>
-          <a:xfrm>
-            <a:off x="140570" y="142967"/>
-            <a:ext cx="6455538" cy="3722212"/>
-          </a:xfrm>
-          <a:prstGeom prst="rect">
-            <a:avLst/>
-          </a:prstGeom>
-        </p:spPr>
-      </p:pic>
-      <p:pic>
-        <p:nvPicPr>
-          <p:cNvPr id="6" name="Imagen 5">
-            <a:extLst>
-              <a:ext uri="{FF2B5EF4-FFF2-40B4-BE49-F238E27FC236}">
-                <a16:creationId xmlns:a16="http://schemas.microsoft.com/office/drawing/2014/main" id="{1D8B2A6D-63CC-4D42-94CF-A115F6972781}"/>
-              </a:ext>
-            </a:extLst>
-          </p:cNvPr>
-          <p:cNvPicPr>
-            <a:picLocks noChangeAspect="1"/>
-          </p:cNvPicPr>
-          <p:nvPr/>
-        </p:nvPicPr>
-        <p:blipFill>
-          <a:blip r:embed="rId4">
-            <a:extLst>
-              <a:ext uri="{28A0092B-C50C-407E-A947-70E740481C1C}">
-                <a14:useLocalDpi xmlns:a14="http://schemas.microsoft.com/office/drawing/2010/main" val="0"/>
-              </a:ext>
-            </a:extLst>
-          </a:blip>
-          <a:stretch>
-            <a:fillRect/>
-          </a:stretch>
-        </p:blipFill>
-        <p:spPr>
-          <a:xfrm>
-            <a:off x="6214368" y="3829741"/>
-            <a:ext cx="5766039" cy="2885291"/>
-          </a:xfrm>
-          <a:prstGeom prst="rect">
-            <a:avLst/>
-          </a:prstGeom>
-        </p:spPr>
-      </p:pic>
       <p:sp>
         <p:nvSpPr>
           <p:cNvPr id="8" name="CuadroTexto 7">
@@ -19643,7 +19760,7 @@
         <p:spPr>
           <a:xfrm>
             <a:off x="7102135" y="709082"/>
-            <a:ext cx="4620088" cy="2554545"/>
+            <a:ext cx="4620088" cy="2800767"/>
           </a:xfrm>
           <a:prstGeom prst="rect">
             <a:avLst/>
@@ -19701,7 +19818,7 @@
                 <a:effectLst/>
                 <a:latin typeface="+mj-lt"/>
               </a:rPr>
-              <a:t>, alineado con estrategias de ventas y premiaciones.</a:t>
+              <a:t>, alineado con estrategias de ventas y galas de premios.</a:t>
             </a:r>
           </a:p>
           <a:p>
@@ -19951,11 +20068,83 @@
                 <a:effectLst/>
                 <a:latin typeface="+mj-lt"/>
               </a:rPr>
-              <a:t>: e prioriza septiembre</a:t>
+              <a:t>: se prioriza septiembre</a:t>
             </a:r>
           </a:p>
         </p:txBody>
       </p:sp>
+      <p:pic>
+        <p:nvPicPr>
+          <p:cNvPr id="3" name="Imagen 2">
+            <a:extLst>
+              <a:ext uri="{FF2B5EF4-FFF2-40B4-BE49-F238E27FC236}">
+                <a16:creationId xmlns:a16="http://schemas.microsoft.com/office/drawing/2014/main" id="{98A2463E-4034-4F5C-AA4C-3FC4756294E6}"/>
+              </a:ext>
+            </a:extLst>
+          </p:cNvPr>
+          <p:cNvPicPr>
+            <a:picLocks noChangeAspect="1"/>
+          </p:cNvPicPr>
+          <p:nvPr/>
+        </p:nvPicPr>
+        <p:blipFill>
+          <a:blip r:embed="rId3">
+            <a:extLst>
+              <a:ext uri="{28A0092B-C50C-407E-A947-70E740481C1C}">
+                <a14:useLocalDpi xmlns:a14="http://schemas.microsoft.com/office/drawing/2010/main" val="0"/>
+              </a:ext>
+            </a:extLst>
+          </a:blip>
+          <a:stretch>
+            <a:fillRect/>
+          </a:stretch>
+        </p:blipFill>
+        <p:spPr>
+          <a:xfrm>
+            <a:off x="140570" y="142967"/>
+            <a:ext cx="6455538" cy="3722212"/>
+          </a:xfrm>
+          <a:prstGeom prst="rect">
+            <a:avLst/>
+          </a:prstGeom>
+        </p:spPr>
+      </p:pic>
+      <p:pic>
+        <p:nvPicPr>
+          <p:cNvPr id="6" name="Imagen 5">
+            <a:extLst>
+              <a:ext uri="{FF2B5EF4-FFF2-40B4-BE49-F238E27FC236}">
+                <a16:creationId xmlns:a16="http://schemas.microsoft.com/office/drawing/2014/main" id="{1D8B2A6D-63CC-4D42-94CF-A115F6972781}"/>
+              </a:ext>
+            </a:extLst>
+          </p:cNvPr>
+          <p:cNvPicPr>
+            <a:picLocks noChangeAspect="1"/>
+          </p:cNvPicPr>
+          <p:nvPr/>
+        </p:nvPicPr>
+        <p:blipFill>
+          <a:blip r:embed="rId4">
+            <a:extLst>
+              <a:ext uri="{28A0092B-C50C-407E-A947-70E740481C1C}">
+                <a14:useLocalDpi xmlns:a14="http://schemas.microsoft.com/office/drawing/2010/main" val="0"/>
+              </a:ext>
+            </a:extLst>
+          </a:blip>
+          <a:stretch>
+            <a:fillRect/>
+          </a:stretch>
+        </p:blipFill>
+        <p:spPr>
+          <a:xfrm>
+            <a:off x="6214368" y="3829741"/>
+            <a:ext cx="5766039" cy="2885291"/>
+          </a:xfrm>
+          <a:prstGeom prst="rect">
+            <a:avLst/>
+          </a:prstGeom>
+        </p:spPr>
+      </p:pic>
       <p:sp>
         <p:nvSpPr>
           <p:cNvPr id="10" name="CuadroTexto 9">

</xml_diff>